<commit_message>
Added 8Decorator and updates to presentation
</commit_message>
<xml_diff>
--- a/My Journey into Dependency Injection.pptx
+++ b/My Journey into Dependency Injection.pptx
@@ -552,14 +552,112 @@
             <a:endParaRPr lang="en-GB" dirty="0" smtClean="0"/>
           </a:p>
           <a:p>
+            <a:pPr marL="0" marR="0" indent="0" algn="l" defTabSz="914400" rtl="0" eaLnBrk="1" fontAlgn="auto" latinLnBrk="0" hangingPunct="1">
+              <a:lnSpc>
+                <a:spcPct val="100000"/>
+              </a:lnSpc>
+              <a:spcBef>
+                <a:spcPts val="0"/>
+              </a:spcBef>
+              <a:spcAft>
+                <a:spcPts val="0"/>
+              </a:spcAft>
+              <a:buClrTx/>
+              <a:buSzTx/>
+              <a:buFontTx/>
+              <a:buNone/>
+              <a:tabLst/>
+              <a:defRPr/>
+            </a:pPr>
             <a:r>
               <a:rPr lang="en-GB" dirty="0" smtClean="0"/>
               <a:t>What this</a:t>
             </a:r>
             <a:r>
               <a:rPr lang="en-GB" baseline="0" dirty="0" smtClean="0"/>
-              <a:t> is about – A way of coding or pattern</a:t>
-            </a:r>
+              <a:t> is about – A way of coding or </a:t>
+            </a:r>
+            <a:r>
+              <a:rPr lang="en-GB" baseline="0" dirty="0" smtClean="0"/>
+              <a:t>pattern.  </a:t>
+            </a:r>
+            <a:r>
+              <a:rPr lang="en-GB" b="1" baseline="0" dirty="0" smtClean="0"/>
+              <a:t>I</a:t>
+            </a:r>
+            <a:r>
+              <a:rPr lang="en-GB" sz="1200" b="1" i="0" kern="1200" dirty="0" smtClean="0">
+                <a:solidFill>
+                  <a:schemeClr val="tx1"/>
+                </a:solidFill>
+                <a:effectLst/>
+                <a:latin typeface="+mn-lt"/>
+                <a:ea typeface="+mn-ea"/>
+                <a:cs typeface="+mn-cs"/>
+              </a:rPr>
+              <a:t>nspired</a:t>
+            </a:r>
+            <a:r>
+              <a:rPr lang="en-GB" sz="1200" b="0" i="0" kern="1200" dirty="0" smtClean="0">
+                <a:solidFill>
+                  <a:schemeClr val="tx1"/>
+                </a:solidFill>
+                <a:effectLst/>
+                <a:latin typeface="+mn-lt"/>
+                <a:ea typeface="+mn-ea"/>
+                <a:cs typeface="+mn-cs"/>
+              </a:rPr>
+              <a:t> by a discussion here at alt.net, and "when is a project big enough to use Dependency Injection".  Share my </a:t>
+            </a:r>
+            <a:r>
+              <a:rPr lang="en-GB" sz="1200" b="1" i="0" kern="1200" dirty="0" smtClean="0">
+                <a:solidFill>
+                  <a:schemeClr val="tx1"/>
+                </a:solidFill>
+                <a:effectLst/>
+                <a:latin typeface="+mn-lt"/>
+                <a:ea typeface="+mn-ea"/>
+                <a:cs typeface="+mn-cs"/>
+              </a:rPr>
+              <a:t>initial despair </a:t>
+            </a:r>
+            <a:r>
+              <a:rPr lang="en-GB" sz="1200" b="0" i="0" kern="1200" dirty="0" smtClean="0">
+                <a:solidFill>
+                  <a:schemeClr val="tx1"/>
+                </a:solidFill>
+                <a:effectLst/>
+                <a:latin typeface="+mn-lt"/>
+                <a:ea typeface="+mn-ea"/>
+                <a:cs typeface="+mn-cs"/>
+              </a:rPr>
+              <a:t>at increase in complexity.. Then realisation it is </a:t>
+            </a:r>
+            <a:r>
+              <a:rPr lang="en-GB" sz="1200" b="1" i="0" kern="1200" dirty="0" smtClean="0">
+                <a:solidFill>
+                  <a:schemeClr val="tx1"/>
+                </a:solidFill>
+                <a:effectLst/>
+                <a:latin typeface="+mn-lt"/>
+                <a:ea typeface="+mn-ea"/>
+                <a:cs typeface="+mn-cs"/>
+              </a:rPr>
+              <a:t>not so hard.</a:t>
+            </a:r>
+            <a:r>
+              <a:rPr lang="en-GB" sz="1200" b="0" i="0" kern="1200" dirty="0" smtClean="0">
+                <a:solidFill>
+                  <a:schemeClr val="tx1"/>
+                </a:solidFill>
+                <a:effectLst/>
+                <a:latin typeface="+mn-lt"/>
+                <a:ea typeface="+mn-ea"/>
+                <a:cs typeface="+mn-cs"/>
+              </a:rPr>
+              <a:t>  Pathway to creating testable maintainable code for real applications. </a:t>
+            </a:r>
+            <a:endParaRPr lang="en-GB" baseline="0" dirty="0" smtClean="0"/>
           </a:p>
           <a:p>
             <a:endParaRPr lang="en-GB" baseline="0" dirty="0" smtClean="0"/>
@@ -960,7 +1058,19 @@
                 <a:ea typeface="+mn-ea"/>
                 <a:cs typeface="+mn-cs"/>
               </a:rPr>
-              <a:t>loose coupling</a:t>
+              <a:t>loose </a:t>
+            </a:r>
+            <a:r>
+              <a:rPr lang="en-GB" sz="1200" b="1" i="1" kern="1200" dirty="0" smtClean="0">
+                <a:solidFill>
+                  <a:schemeClr val="tx1"/>
+                </a:solidFill>
+                <a:effectLst/>
+                <a:latin typeface="+mn-lt"/>
+                <a:ea typeface="+mn-ea"/>
+                <a:cs typeface="+mn-cs"/>
+              </a:rPr>
+              <a:t>coupling</a:t>
             </a:r>
           </a:p>
           <a:p>
@@ -1162,8 +1272,34 @@
           <a:p>
             <a:r>
               <a:rPr lang="en-GB" baseline="0" dirty="0" smtClean="0"/>
-              <a:t>Collapse code down</a:t>
-            </a:r>
+              <a:t>Collapse code </a:t>
+            </a:r>
+            <a:r>
+              <a:rPr lang="en-GB" baseline="0" dirty="0" smtClean="0"/>
+              <a:t>down</a:t>
+            </a:r>
+          </a:p>
+          <a:p>
+            <a:endParaRPr lang="en-GB" baseline="0" dirty="0" smtClean="0"/>
+          </a:p>
+          <a:p>
+            <a:r>
+              <a:rPr lang="en-GB" baseline="0" dirty="0" smtClean="0"/>
+              <a:t>**</a:t>
+            </a:r>
+            <a:r>
+              <a:rPr lang="en-GB" baseline="0" dirty="0" err="1" smtClean="0"/>
+              <a:t>lego</a:t>
+            </a:r>
+            <a:r>
+              <a:rPr lang="en-GB" baseline="0" dirty="0" smtClean="0"/>
+              <a:t> </a:t>
+            </a:r>
+            <a:r>
+              <a:rPr lang="en-GB" baseline="0" dirty="0" err="1" smtClean="0"/>
+              <a:t>piccie</a:t>
+            </a:r>
+            <a:endParaRPr lang="en-GB" baseline="0" dirty="0" smtClean="0"/>
           </a:p>
           <a:p>
             <a:endParaRPr lang="en-GB" dirty="0"/>
@@ -1197,6 +1333,156 @@
     <p:extLst>
       <p:ext uri="{BB962C8B-B14F-4D97-AF65-F5344CB8AC3E}">
         <p14:creationId xmlns:p14="http://schemas.microsoft.com/office/powerpoint/2010/main" val="2622898692"/>
+      </p:ext>
+    </p:extLst>
+  </p:cSld>
+  <p:clrMapOvr>
+    <a:masterClrMapping/>
+  </p:clrMapOvr>
+</p:notes>
+</file>
+
+<file path=ppt/notesSlides/notesSlide5.xml><?xml version="1.0" encoding="utf-8"?>
+<p:notes xmlns:a="http://schemas.openxmlformats.org/drawingml/2006/main" xmlns:r="http://schemas.openxmlformats.org/officeDocument/2006/relationships" xmlns:p="http://schemas.openxmlformats.org/presentationml/2006/main">
+  <p:cSld>
+    <p:spTree>
+      <p:nvGrpSpPr>
+        <p:cNvPr id="1" name=""/>
+        <p:cNvGrpSpPr/>
+        <p:nvPr/>
+      </p:nvGrpSpPr>
+      <p:grpSpPr>
+        <a:xfrm>
+          <a:off x="0" y="0"/>
+          <a:ext cx="0" cy="0"/>
+          <a:chOff x="0" y="0"/>
+          <a:chExt cx="0" cy="0"/>
+        </a:xfrm>
+      </p:grpSpPr>
+      <p:sp>
+        <p:nvSpPr>
+          <p:cNvPr id="2" name="Slide Image Placeholder 1"/>
+          <p:cNvSpPr>
+            <a:spLocks noGrp="1" noRot="1" noChangeAspect="1"/>
+          </p:cNvSpPr>
+          <p:nvPr>
+            <p:ph type="sldImg"/>
+          </p:nvPr>
+        </p:nvSpPr>
+        <p:spPr/>
+      </p:sp>
+      <p:sp>
+        <p:nvSpPr>
+          <p:cNvPr id="3" name="Notes Placeholder 2"/>
+          <p:cNvSpPr>
+            <a:spLocks noGrp="1"/>
+          </p:cNvSpPr>
+          <p:nvPr>
+            <p:ph type="body" idx="1"/>
+          </p:nvPr>
+        </p:nvSpPr>
+        <p:spPr/>
+        <p:txBody>
+          <a:bodyPr/>
+          <a:lstStyle/>
+          <a:p>
+            <a:endParaRPr lang="en-GB" dirty="0" smtClean="0"/>
+          </a:p>
+          <a:p>
+            <a:pPr marL="0" marR="0" indent="0" algn="l" defTabSz="914400" rtl="0" eaLnBrk="1" fontAlgn="auto" latinLnBrk="0" hangingPunct="1">
+              <a:lnSpc>
+                <a:spcPct val="100000"/>
+              </a:lnSpc>
+              <a:spcBef>
+                <a:spcPts val="0"/>
+              </a:spcBef>
+              <a:spcAft>
+                <a:spcPts val="0"/>
+              </a:spcAft>
+              <a:buClrTx/>
+              <a:buSzTx/>
+              <a:buFontTx/>
+              <a:buNone/>
+              <a:tabLst/>
+              <a:defRPr/>
+            </a:pPr>
+            <a:r>
+              <a:rPr lang="en-GB" dirty="0" err="1" smtClean="0"/>
+              <a:t>IoC</a:t>
+            </a:r>
+            <a:r>
+              <a:rPr lang="en-GB" dirty="0" smtClean="0"/>
+              <a:t> Container – Unity, </a:t>
+            </a:r>
+            <a:r>
+              <a:rPr lang="en-GB" dirty="0" err="1" smtClean="0"/>
+              <a:t>ninject</a:t>
+            </a:r>
+            <a:r>
+              <a:rPr lang="en-GB" dirty="0" smtClean="0"/>
+              <a:t>,</a:t>
+            </a:r>
+            <a:r>
+              <a:rPr lang="en-GB" baseline="0" dirty="0" smtClean="0"/>
+              <a:t> Castle Windsor</a:t>
+            </a:r>
+            <a:endParaRPr lang="en-GB" dirty="0" smtClean="0"/>
+          </a:p>
+          <a:p>
+            <a:endParaRPr lang="en-GB" dirty="0" smtClean="0"/>
+          </a:p>
+          <a:p>
+            <a:endParaRPr lang="en-GB" dirty="0" smtClean="0"/>
+          </a:p>
+          <a:p>
+            <a:r>
+              <a:rPr lang="en-GB" dirty="0" smtClean="0"/>
+              <a:t>Lifestyle” (Windsor) Lifecycle of component – singleton, transient, </a:t>
+            </a:r>
+            <a:r>
+              <a:rPr lang="en-GB" dirty="0" err="1" smtClean="0"/>
+              <a:t>perwebrequest</a:t>
+            </a:r>
+            <a:endParaRPr lang="en-GB" dirty="0" smtClean="0"/>
+          </a:p>
+          <a:p>
+            <a:r>
+              <a:rPr lang="en-GB" dirty="0" smtClean="0"/>
+              <a:t>How things get disposed?</a:t>
+            </a:r>
+          </a:p>
+          <a:p>
+            <a:endParaRPr lang="en-GB" dirty="0"/>
+          </a:p>
+        </p:txBody>
+      </p:sp>
+      <p:sp>
+        <p:nvSpPr>
+          <p:cNvPr id="4" name="Slide Number Placeholder 3"/>
+          <p:cNvSpPr>
+            <a:spLocks noGrp="1"/>
+          </p:cNvSpPr>
+          <p:nvPr>
+            <p:ph type="sldNum" sz="quarter" idx="10"/>
+          </p:nvPr>
+        </p:nvSpPr>
+        <p:spPr/>
+        <p:txBody>
+          <a:bodyPr/>
+          <a:lstStyle/>
+          <a:p>
+            <a:fld id="{A8040AC0-89A1-4E06-96D3-E89AFC69B5AD}" type="slidenum">
+              <a:rPr lang="en-GB" smtClean="0"/>
+              <a:t>6</a:t>
+            </a:fld>
+            <a:endParaRPr lang="en-GB"/>
+          </a:p>
+        </p:txBody>
+      </p:sp>
+    </p:spTree>
+    <p:extLst>
+      <p:ext uri="{BB962C8B-B14F-4D97-AF65-F5344CB8AC3E}">
+        <p14:creationId xmlns:p14="http://schemas.microsoft.com/office/powerpoint/2010/main" val="3701073233"/>
       </p:ext>
     </p:extLst>
   </p:cSld>
@@ -4417,7 +4703,7 @@
           <a:p>
             <a:r>
               <a:rPr lang="en-GB" dirty="0" smtClean="0"/>
-              <a:t>The Basics</a:t>
+              <a:t>Exploring DI!</a:t>
             </a:r>
             <a:endParaRPr lang="en-GB" dirty="0"/>
           </a:p>
@@ -4826,25 +5112,57 @@
             <p:ph idx="1"/>
           </p:nvPr>
         </p:nvSpPr>
-        <p:spPr/>
-        <p:txBody>
-          <a:bodyPr/>
-          <a:lstStyle/>
-          <a:p>
+        <p:spPr>
+          <a:xfrm>
+            <a:off x="457200" y="1600200"/>
+            <a:ext cx="6059016" cy="4525963"/>
+          </a:xfrm>
+        </p:spPr>
+        <p:txBody>
+          <a:bodyPr>
+            <a:normAutofit/>
+          </a:bodyPr>
+          <a:lstStyle/>
+          <a:p>
+            <a:pPr marL="0" indent="0">
+              <a:buNone/>
+            </a:pPr>
             <a:r>
               <a:rPr lang="en-GB" dirty="0" smtClean="0"/>
-              <a:t>Poor Mans DI / Pure DI / Constructor Based DI</a:t>
-            </a:r>
-          </a:p>
-          <a:p>
+              <a:t>Poor Mans DI / Pure DI / Constructor Based </a:t>
+            </a:r>
+            <a:r>
+              <a:rPr lang="en-GB" dirty="0" smtClean="0"/>
+              <a:t>DI – a way of doing Dependency inversion</a:t>
+            </a:r>
+          </a:p>
+          <a:p>
+            <a:pPr marL="0" indent="0">
+              <a:buNone/>
+            </a:pPr>
+            <a:endParaRPr lang="en-GB" dirty="0" smtClean="0"/>
+          </a:p>
+          <a:p>
+            <a:pPr marL="0" indent="0">
+              <a:buNone/>
+            </a:pPr>
+            <a:r>
+              <a:rPr lang="en-GB" dirty="0" smtClean="0"/>
+              <a:t>Dependency Inversion / </a:t>
+            </a:r>
             <a:r>
               <a:rPr lang="en-GB" dirty="0" err="1" smtClean="0"/>
               <a:t>IoC</a:t>
             </a:r>
             <a:r>
               <a:rPr lang="en-GB" dirty="0" smtClean="0"/>
-              <a:t> Container</a:t>
-            </a:r>
+              <a:t> Inversion of Control – the pattern or principle</a:t>
+            </a:r>
+          </a:p>
+          <a:p>
+            <a:pPr marL="0" indent="0">
+              <a:buNone/>
+            </a:pPr>
             <a:endParaRPr lang="en-GB" dirty="0"/>
           </a:p>
         </p:txBody>
@@ -4858,14 +5176,14 @@
           <p:nvPr/>
         </p:nvPicPr>
         <p:blipFill>
-          <a:blip r:embed="rId2"/>
+          <a:blip r:embed="rId3"/>
           <a:stretch>
             <a:fillRect/>
           </a:stretch>
         </p:blipFill>
         <p:spPr>
           <a:xfrm>
-            <a:off x="6229350" y="3184525"/>
+            <a:off x="6686550" y="3709789"/>
             <a:ext cx="2457450" cy="3124200"/>
           </a:xfrm>
           <a:prstGeom prst="rect">

</xml_diff>

<commit_message>
Small changes example8 and presentation
</commit_message>
<xml_diff>
--- a/My Journey into Dependency Injection.pptx
+++ b/My Journey into Dependency Injection.pptx
@@ -16,7 +16,7 @@
     <p:sldId id="261" r:id="rId7"/>
   </p:sldIdLst>
   <p:sldSz cx="9144000" cy="6858000" type="screen4x3"/>
-  <p:notesSz cx="6858000" cy="9144000"/>
+  <p:notesSz cx="6794500" cy="9906000"/>
   <p:defaultTextStyle>
     <a:defPPr>
       <a:defRPr lang="en-US"/>
@@ -166,7 +166,7 @@
         <p:spPr>
           <a:xfrm>
             <a:off x="0" y="0"/>
-            <a:ext cx="2971800" cy="457200"/>
+            <a:ext cx="2944283" cy="495300"/>
           </a:xfrm>
           <a:prstGeom prst="rect">
             <a:avLst/>
@@ -196,8 +196,8 @@
         </p:nvSpPr>
         <p:spPr>
           <a:xfrm>
-            <a:off x="3884613" y="0"/>
-            <a:ext cx="2971800" cy="457200"/>
+            <a:off x="3848645" y="0"/>
+            <a:ext cx="2944283" cy="495300"/>
           </a:xfrm>
           <a:prstGeom prst="rect">
             <a:avLst/>
@@ -231,8 +231,8 @@
         </p:nvSpPr>
         <p:spPr>
           <a:xfrm>
-            <a:off x="1143000" y="685800"/>
-            <a:ext cx="4572000" cy="3429000"/>
+            <a:off x="920750" y="742950"/>
+            <a:ext cx="4953000" cy="3714750"/>
           </a:xfrm>
           <a:prstGeom prst="rect">
             <a:avLst/>
@@ -264,8 +264,8 @@
         </p:nvSpPr>
         <p:spPr>
           <a:xfrm>
-            <a:off x="685800" y="4343400"/>
-            <a:ext cx="5486400" cy="4114800"/>
+            <a:off x="679450" y="4705350"/>
+            <a:ext cx="5435600" cy="4457700"/>
           </a:xfrm>
           <a:prstGeom prst="rect">
             <a:avLst/>
@@ -324,8 +324,8 @@
         </p:nvSpPr>
         <p:spPr>
           <a:xfrm>
-            <a:off x="0" y="8685213"/>
-            <a:ext cx="2971800" cy="457200"/>
+            <a:off x="0" y="9408981"/>
+            <a:ext cx="2944283" cy="495300"/>
           </a:xfrm>
           <a:prstGeom prst="rect">
             <a:avLst/>
@@ -355,8 +355,8 @@
         </p:nvSpPr>
         <p:spPr>
           <a:xfrm>
-            <a:off x="3884613" y="8685213"/>
-            <a:ext cx="2971800" cy="457200"/>
+            <a:off x="3848645" y="9408981"/>
+            <a:ext cx="2944283" cy="495300"/>
           </a:xfrm>
           <a:prstGeom prst="rect">
             <a:avLst/>
@@ -525,282 +525,7 @@
           <a:bodyPr/>
           <a:lstStyle/>
           <a:p>
-            <a:r>
-              <a:rPr lang="en-GB" dirty="0" smtClean="0"/>
-              <a:t>*okay</a:t>
-            </a:r>
-            <a:r>
-              <a:rPr lang="en-GB" baseline="0" dirty="0" smtClean="0"/>
-              <a:t> to record sound and my screen?*</a:t>
-            </a:r>
-          </a:p>
-          <a:p>
-            <a:endParaRPr lang="en-GB" dirty="0" smtClean="0"/>
-          </a:p>
-          <a:p>
-            <a:r>
-              <a:rPr lang="en-GB" dirty="0" smtClean="0"/>
-              <a:t>Who I am – Dave Mateer, Software developer with .NET for 7 years, work for</a:t>
-            </a:r>
-            <a:r>
-              <a:rPr lang="en-GB" baseline="0" dirty="0" smtClean="0"/>
-              <a:t> an Edinburgh based company doing a lot of legacy coding in Financial Services organisations</a:t>
-            </a:r>
-            <a:endParaRPr lang="en-GB" dirty="0" smtClean="0"/>
-          </a:p>
-          <a:p>
-            <a:endParaRPr lang="en-GB" dirty="0" smtClean="0"/>
-          </a:p>
-          <a:p>
-            <a:pPr marL="0" marR="0" indent="0" algn="l" defTabSz="914400" rtl="0" eaLnBrk="1" fontAlgn="auto" latinLnBrk="0" hangingPunct="1">
-              <a:lnSpc>
-                <a:spcPct val="100000"/>
-              </a:lnSpc>
-              <a:spcBef>
-                <a:spcPts val="0"/>
-              </a:spcBef>
-              <a:spcAft>
-                <a:spcPts val="0"/>
-              </a:spcAft>
-              <a:buClrTx/>
-              <a:buSzTx/>
-              <a:buFontTx/>
-              <a:buNone/>
-              <a:tabLst/>
-              <a:defRPr/>
-            </a:pPr>
-            <a:r>
-              <a:rPr lang="en-GB" dirty="0" smtClean="0"/>
-              <a:t>What this</a:t>
-            </a:r>
-            <a:r>
-              <a:rPr lang="en-GB" baseline="0" dirty="0" smtClean="0"/>
-              <a:t> is about – A way of coding or </a:t>
-            </a:r>
-            <a:r>
-              <a:rPr lang="en-GB" baseline="0" dirty="0" smtClean="0"/>
-              <a:t>pattern.  </a:t>
-            </a:r>
-            <a:r>
-              <a:rPr lang="en-GB" b="1" baseline="0" dirty="0" smtClean="0"/>
-              <a:t>I</a:t>
-            </a:r>
-            <a:r>
-              <a:rPr lang="en-GB" sz="1200" b="1" i="0" kern="1200" dirty="0" smtClean="0">
-                <a:solidFill>
-                  <a:schemeClr val="tx1"/>
-                </a:solidFill>
-                <a:effectLst/>
-                <a:latin typeface="+mn-lt"/>
-                <a:ea typeface="+mn-ea"/>
-                <a:cs typeface="+mn-cs"/>
-              </a:rPr>
-              <a:t>nspired</a:t>
-            </a:r>
-            <a:r>
-              <a:rPr lang="en-GB" sz="1200" b="0" i="0" kern="1200" dirty="0" smtClean="0">
-                <a:solidFill>
-                  <a:schemeClr val="tx1"/>
-                </a:solidFill>
-                <a:effectLst/>
-                <a:latin typeface="+mn-lt"/>
-                <a:ea typeface="+mn-ea"/>
-                <a:cs typeface="+mn-cs"/>
-              </a:rPr>
-              <a:t> by a discussion here at alt.net, and "when is a project big enough to use Dependency Injection".  Share my </a:t>
-            </a:r>
-            <a:r>
-              <a:rPr lang="en-GB" sz="1200" b="1" i="0" kern="1200" dirty="0" smtClean="0">
-                <a:solidFill>
-                  <a:schemeClr val="tx1"/>
-                </a:solidFill>
-                <a:effectLst/>
-                <a:latin typeface="+mn-lt"/>
-                <a:ea typeface="+mn-ea"/>
-                <a:cs typeface="+mn-cs"/>
-              </a:rPr>
-              <a:t>initial despair </a:t>
-            </a:r>
-            <a:r>
-              <a:rPr lang="en-GB" sz="1200" b="0" i="0" kern="1200" dirty="0" smtClean="0">
-                <a:solidFill>
-                  <a:schemeClr val="tx1"/>
-                </a:solidFill>
-                <a:effectLst/>
-                <a:latin typeface="+mn-lt"/>
-                <a:ea typeface="+mn-ea"/>
-                <a:cs typeface="+mn-cs"/>
-              </a:rPr>
-              <a:t>at increase in complexity.. Then realisation it is </a:t>
-            </a:r>
-            <a:r>
-              <a:rPr lang="en-GB" sz="1200" b="1" i="0" kern="1200" dirty="0" smtClean="0">
-                <a:solidFill>
-                  <a:schemeClr val="tx1"/>
-                </a:solidFill>
-                <a:effectLst/>
-                <a:latin typeface="+mn-lt"/>
-                <a:ea typeface="+mn-ea"/>
-                <a:cs typeface="+mn-cs"/>
-              </a:rPr>
-              <a:t>not so hard.</a:t>
-            </a:r>
-            <a:r>
-              <a:rPr lang="en-GB" sz="1200" b="0" i="0" kern="1200" dirty="0" smtClean="0">
-                <a:solidFill>
-                  <a:schemeClr val="tx1"/>
-                </a:solidFill>
-                <a:effectLst/>
-                <a:latin typeface="+mn-lt"/>
-                <a:ea typeface="+mn-ea"/>
-                <a:cs typeface="+mn-cs"/>
-              </a:rPr>
-              <a:t>  Pathway to creating testable maintainable code for real applications. </a:t>
-            </a:r>
-            <a:endParaRPr lang="en-GB" baseline="0" dirty="0" smtClean="0"/>
-          </a:p>
-          <a:p>
-            <a:endParaRPr lang="en-GB" baseline="0" dirty="0" smtClean="0"/>
-          </a:p>
-          <a:p>
-            <a:r>
-              <a:rPr lang="en-GB" baseline="0" dirty="0" smtClean="0"/>
-              <a:t>Why should you care - </a:t>
-            </a:r>
-            <a:r>
-              <a:rPr lang="en-GB" sz="1200" b="0" i="0" kern="1200" dirty="0" smtClean="0">
-                <a:solidFill>
-                  <a:schemeClr val="tx1"/>
-                </a:solidFill>
-                <a:effectLst/>
-                <a:latin typeface="+mn-lt"/>
-                <a:ea typeface="+mn-ea"/>
-                <a:cs typeface="+mn-cs"/>
-              </a:rPr>
-              <a:t> A lot of time </a:t>
-            </a:r>
-            <a:r>
-              <a:rPr lang="en-GB" sz="1200" b="1" i="0" kern="1200" dirty="0" smtClean="0">
-                <a:solidFill>
-                  <a:schemeClr val="tx1"/>
-                </a:solidFill>
-                <a:effectLst/>
-                <a:latin typeface="+mn-lt"/>
-                <a:ea typeface="+mn-ea"/>
-                <a:cs typeface="+mn-cs"/>
-              </a:rPr>
-              <a:t>maintaining and extending</a:t>
-            </a:r>
-            <a:r>
-              <a:rPr lang="en-GB" sz="1200" b="0" i="0" kern="1200" dirty="0" smtClean="0">
-                <a:solidFill>
-                  <a:schemeClr val="tx1"/>
-                </a:solidFill>
-                <a:effectLst/>
-                <a:latin typeface="+mn-lt"/>
-                <a:ea typeface="+mn-ea"/>
-                <a:cs typeface="+mn-cs"/>
-              </a:rPr>
-              <a:t> existing code</a:t>
-            </a:r>
-          </a:p>
-          <a:p>
-            <a:r>
-              <a:rPr lang="en-GB" sz="1200" b="0" i="0" kern="1200" dirty="0" smtClean="0">
-                <a:solidFill>
-                  <a:schemeClr val="tx1"/>
-                </a:solidFill>
-                <a:effectLst/>
-                <a:latin typeface="+mn-lt"/>
-                <a:ea typeface="+mn-ea"/>
-                <a:cs typeface="+mn-cs"/>
-              </a:rPr>
-              <a:t>One of the ways to make </a:t>
-            </a:r>
-            <a:r>
-              <a:rPr lang="en-GB" sz="1200" b="1" i="1" kern="1200" dirty="0" smtClean="0">
-                <a:solidFill>
-                  <a:schemeClr val="tx1"/>
-                </a:solidFill>
-                <a:effectLst/>
-                <a:latin typeface="+mn-lt"/>
-                <a:ea typeface="+mn-ea"/>
-                <a:cs typeface="+mn-cs"/>
-              </a:rPr>
-              <a:t>maintainable code</a:t>
-            </a:r>
-            <a:r>
-              <a:rPr lang="en-GB" sz="1200" b="0" i="0" kern="1200" dirty="0" smtClean="0">
-                <a:solidFill>
-                  <a:schemeClr val="tx1"/>
-                </a:solidFill>
-                <a:effectLst/>
-                <a:latin typeface="+mn-lt"/>
-                <a:ea typeface="+mn-ea"/>
-                <a:cs typeface="+mn-cs"/>
-              </a:rPr>
-              <a:t> is through </a:t>
-            </a:r>
-            <a:r>
-              <a:rPr lang="en-GB" sz="1200" b="1" i="1" kern="1200" dirty="0" smtClean="0">
-                <a:solidFill>
-                  <a:schemeClr val="tx1"/>
-                </a:solidFill>
-                <a:effectLst/>
-                <a:latin typeface="+mn-lt"/>
-                <a:ea typeface="+mn-ea"/>
-                <a:cs typeface="+mn-cs"/>
-              </a:rPr>
-              <a:t>loose coupling</a:t>
-            </a:r>
-            <a:r>
-              <a:rPr lang="en-GB" sz="1200" b="0" i="1" kern="1200" dirty="0" smtClean="0">
-                <a:solidFill>
-                  <a:schemeClr val="tx1"/>
-                </a:solidFill>
-                <a:effectLst/>
-                <a:latin typeface="+mn-lt"/>
-                <a:ea typeface="+mn-ea"/>
-                <a:cs typeface="+mn-cs"/>
-              </a:rPr>
-              <a:t>.  </a:t>
-            </a:r>
-            <a:r>
-              <a:rPr lang="en-GB" sz="1200" b="0" i="0" kern="1200" dirty="0" smtClean="0">
-                <a:solidFill>
-                  <a:schemeClr val="tx1"/>
-                </a:solidFill>
-                <a:effectLst/>
-                <a:latin typeface="+mn-lt"/>
-                <a:ea typeface="+mn-ea"/>
-                <a:cs typeface="+mn-cs"/>
-              </a:rPr>
-              <a:t>DI enables </a:t>
-            </a:r>
-            <a:r>
-              <a:rPr lang="en-GB" sz="1200" b="1" i="1" kern="1200" dirty="0" smtClean="0">
-                <a:solidFill>
-                  <a:schemeClr val="tx1"/>
-                </a:solidFill>
-                <a:effectLst/>
-                <a:latin typeface="+mn-lt"/>
-                <a:ea typeface="+mn-ea"/>
-                <a:cs typeface="+mn-cs"/>
-              </a:rPr>
-              <a:t>loose coupling</a:t>
-            </a:r>
-            <a:endParaRPr lang="en-GB" sz="1200" b="1" i="0" kern="1200" dirty="0" smtClean="0">
-              <a:solidFill>
-                <a:schemeClr val="tx1"/>
-              </a:solidFill>
-              <a:effectLst/>
-              <a:latin typeface="+mn-lt"/>
-              <a:ea typeface="+mn-ea"/>
-              <a:cs typeface="+mn-cs"/>
-            </a:endParaRPr>
-          </a:p>
-          <a:p>
-            <a:endParaRPr lang="en-GB" dirty="0"/>
+            <a:endParaRPr lang="en-GB"/>
           </a:p>
         </p:txBody>
       </p:sp>
@@ -821,7 +546,7 @@
           <a:p>
             <a:fld id="{A8040AC0-89A1-4E06-96D3-E89AFC69B5AD}" type="slidenum">
               <a:rPr lang="en-GB" smtClean="0"/>
-              <a:t>2</a:t>
+              <a:t>1</a:t>
             </a:fld>
             <a:endParaRPr lang="en-GB"/>
           </a:p>
@@ -830,7 +555,7 @@
     </p:spTree>
     <p:extLst>
       <p:ext uri="{BB962C8B-B14F-4D97-AF65-F5344CB8AC3E}">
-        <p14:creationId xmlns:p14="http://schemas.microsoft.com/office/powerpoint/2010/main" val="2059128894"/>
+        <p14:creationId xmlns:p14="http://schemas.microsoft.com/office/powerpoint/2010/main" val="1691458371"/>
       </p:ext>
     </p:extLst>
   </p:cSld>
@@ -886,7 +611,11 @@
           <a:p>
             <a:r>
               <a:rPr lang="en-GB" dirty="0" smtClean="0"/>
-              <a:t>Example8</a:t>
+              <a:t>*okay</a:t>
+            </a:r>
+            <a:r>
+              <a:rPr lang="en-GB" baseline="0" dirty="0" smtClean="0"/>
+              <a:t> to record sound and my screen?*</a:t>
             </a:r>
           </a:p>
           <a:p>
@@ -895,53 +624,59 @@
           <a:p>
             <a:r>
               <a:rPr lang="en-GB" dirty="0" smtClean="0"/>
-              <a:t>This is a console app which reads a text file (</a:t>
-            </a:r>
-            <a:r>
-              <a:rPr lang="en-GB" dirty="0" err="1" smtClean="0"/>
-              <a:t>sql</a:t>
-            </a:r>
+              <a:t>Who I am – Dave Mateer, Software developer with .NET for 7 years, work for</a:t>
+            </a:r>
+            <a:r>
+              <a:rPr lang="en-GB" baseline="0" dirty="0" smtClean="0"/>
+              <a:t> an Edinburgh based company doing a lot of legacy coding in Financial Services organisations</a:t>
+            </a:r>
+            <a:endParaRPr lang="en-GB" dirty="0" smtClean="0"/>
+          </a:p>
+          <a:p>
+            <a:endParaRPr lang="en-GB" dirty="0" smtClean="0"/>
+          </a:p>
+          <a:p>
+            <a:pPr marL="0" marR="0" indent="0" algn="l" defTabSz="914400" rtl="0" eaLnBrk="1" fontAlgn="auto" latinLnBrk="0" hangingPunct="1">
+              <a:lnSpc>
+                <a:spcPct val="100000"/>
+              </a:lnSpc>
+              <a:spcBef>
+                <a:spcPts val="0"/>
+              </a:spcBef>
+              <a:spcAft>
+                <a:spcPts val="0"/>
+              </a:spcAft>
+              <a:buClrTx/>
+              <a:buSzTx/>
+              <a:buFontTx/>
+              <a:buNone/>
+              <a:tabLst/>
+              <a:defRPr/>
+            </a:pPr>
             <a:r>
               <a:rPr lang="en-GB" dirty="0" smtClean="0"/>
-              <a:t> in it), searches for an old </a:t>
-            </a:r>
-            <a:r>
-              <a:rPr lang="en-GB" dirty="0" err="1" smtClean="0"/>
-              <a:t>db</a:t>
-            </a:r>
-            <a:r>
-              <a:rPr lang="en-GB" dirty="0" smtClean="0"/>
-              <a:t> name</a:t>
+              <a:t>What this</a:t>
             </a:r>
             <a:r>
               <a:rPr lang="en-GB" baseline="0" dirty="0" smtClean="0"/>
-              <a:t>, replaces it with a new </a:t>
-            </a:r>
-            <a:r>
-              <a:rPr lang="en-GB" baseline="0" dirty="0" err="1" smtClean="0"/>
-              <a:t>dbName</a:t>
-            </a:r>
-            <a:endParaRPr lang="en-GB" baseline="0" dirty="0" smtClean="0"/>
-          </a:p>
-          <a:p>
-            <a:r>
-              <a:rPr lang="en-GB" baseline="0" dirty="0" smtClean="0"/>
-              <a:t>Then writes the output to the screen</a:t>
-            </a:r>
-          </a:p>
-          <a:p>
-            <a:endParaRPr lang="en-GB" baseline="0" dirty="0" smtClean="0"/>
-          </a:p>
-          <a:p>
-            <a:r>
-              <a:rPr lang="en-GB" baseline="0" dirty="0" smtClean="0"/>
-              <a:t>Show text file</a:t>
-            </a:r>
-          </a:p>
-          <a:p>
-            <a:endParaRPr lang="en-GB" baseline="0" dirty="0" smtClean="0"/>
-          </a:p>
-          <a:p>
+              <a:t> is about – A way of coding or pattern.  </a:t>
+            </a:r>
+            <a:r>
+              <a:rPr lang="en-GB" b="1" baseline="0" dirty="0" smtClean="0"/>
+              <a:t>I</a:t>
+            </a:r>
+            <a:r>
+              <a:rPr lang="en-GB" sz="1200" b="1" i="0" kern="1200" dirty="0" smtClean="0">
+                <a:solidFill>
+                  <a:schemeClr val="tx1"/>
+                </a:solidFill>
+                <a:effectLst/>
+                <a:latin typeface="+mn-lt"/>
+                <a:ea typeface="+mn-ea"/>
+                <a:cs typeface="+mn-cs"/>
+              </a:rPr>
+              <a:t>nspired</a:t>
+            </a:r>
             <a:r>
               <a:rPr lang="en-GB" sz="1200" b="0" i="0" kern="1200" dirty="0" smtClean="0">
                 <a:solidFill>
@@ -952,10 +687,10 @@
                 <a:ea typeface="+mn-ea"/>
                 <a:cs typeface="+mn-cs"/>
               </a:rPr>
-              <a:t>This</a:t>
-            </a:r>
-            <a:r>
-              <a:rPr lang="en-GB" sz="1200" b="0" i="0" kern="1200" baseline="0" dirty="0" smtClean="0">
+              <a:t> by a discussion here at alt.net, and "when is a project big enough to use Dependency Injection".  Share my </a:t>
+            </a:r>
+            <a:r>
+              <a:rPr lang="en-GB" sz="1200" b="1" i="0" kern="1200" dirty="0" smtClean="0">
                 <a:solidFill>
                   <a:schemeClr val="tx1"/>
                 </a:solidFill>
@@ -964,10 +699,10 @@
                 <a:ea typeface="+mn-ea"/>
                 <a:cs typeface="+mn-cs"/>
               </a:rPr>
-              <a:t> application is going to be long lived and needs be </a:t>
-            </a:r>
-            <a:r>
-              <a:rPr lang="en-GB" sz="1200" b="1" i="0" kern="1200" baseline="0" dirty="0" smtClean="0">
+              <a:t>initial despair </a:t>
+            </a:r>
+            <a:r>
+              <a:rPr lang="en-GB" sz="1200" b="0" i="0" kern="1200" dirty="0" smtClean="0">
                 <a:solidFill>
                   <a:schemeClr val="tx1"/>
                 </a:solidFill>
@@ -976,10 +711,10 @@
                 <a:ea typeface="+mn-ea"/>
                 <a:cs typeface="+mn-cs"/>
               </a:rPr>
-              <a:t>maintained</a:t>
-            </a:r>
-            <a:r>
-              <a:rPr lang="en-GB" sz="1200" b="0" i="0" kern="1200" baseline="0" dirty="0" smtClean="0">
+              <a:t>at increase in complexity.. Then realisation it is </a:t>
+            </a:r>
+            <a:r>
+              <a:rPr lang="en-GB" sz="1200" b="1" i="0" kern="1200" dirty="0" smtClean="0">
                 <a:solidFill>
                   <a:schemeClr val="tx1"/>
                 </a:solidFill>
@@ -988,28 +723,66 @@
                 <a:ea typeface="+mn-ea"/>
                 <a:cs typeface="+mn-cs"/>
               </a:rPr>
-              <a:t> over many years and many developers</a:t>
-            </a:r>
-            <a:endParaRPr lang="en-GB" sz="1200" b="0" i="0" kern="1200" dirty="0" smtClean="0">
-              <a:solidFill>
-                <a:schemeClr val="tx1"/>
-              </a:solidFill>
-              <a:effectLst/>
-              <a:latin typeface="+mn-lt"/>
-              <a:ea typeface="+mn-ea"/>
-              <a:cs typeface="+mn-cs"/>
-            </a:endParaRPr>
-          </a:p>
-          <a:p>
-            <a:endParaRPr lang="en-GB" sz="1200" b="0" i="0" kern="1200" dirty="0" smtClean="0">
-              <a:solidFill>
-                <a:schemeClr val="tx1"/>
-              </a:solidFill>
-              <a:effectLst/>
-              <a:latin typeface="+mn-lt"/>
-              <a:ea typeface="+mn-ea"/>
-              <a:cs typeface="+mn-cs"/>
-            </a:endParaRPr>
+              <a:t>not so hard.</a:t>
+            </a:r>
+            <a:r>
+              <a:rPr lang="en-GB" sz="1200" b="0" i="0" kern="1200" dirty="0" smtClean="0">
+                <a:solidFill>
+                  <a:schemeClr val="tx1"/>
+                </a:solidFill>
+                <a:effectLst/>
+                <a:latin typeface="+mn-lt"/>
+                <a:ea typeface="+mn-ea"/>
+                <a:cs typeface="+mn-cs"/>
+              </a:rPr>
+              <a:t>  Pathway to creating testable maintainable code for real applications. </a:t>
+            </a:r>
+            <a:endParaRPr lang="en-GB" baseline="0" dirty="0" smtClean="0"/>
+          </a:p>
+          <a:p>
+            <a:endParaRPr lang="en-GB" baseline="0" dirty="0" smtClean="0"/>
+          </a:p>
+          <a:p>
+            <a:r>
+              <a:rPr lang="en-GB" baseline="0" dirty="0" smtClean="0"/>
+              <a:t>Why should you care - </a:t>
+            </a:r>
+            <a:r>
+              <a:rPr lang="en-GB" sz="1200" b="0" i="0" kern="1200" dirty="0" smtClean="0">
+                <a:solidFill>
+                  <a:schemeClr val="tx1"/>
+                </a:solidFill>
+                <a:effectLst/>
+                <a:latin typeface="+mn-lt"/>
+                <a:ea typeface="+mn-ea"/>
+                <a:cs typeface="+mn-cs"/>
+              </a:rPr>
+              <a:t> A lot of time </a:t>
+            </a:r>
+            <a:r>
+              <a:rPr lang="en-GB" sz="1200" b="1" i="0" kern="1200" dirty="0" smtClean="0">
+                <a:solidFill>
+                  <a:schemeClr val="tx1"/>
+                </a:solidFill>
+                <a:effectLst/>
+                <a:latin typeface="+mn-lt"/>
+                <a:ea typeface="+mn-ea"/>
+                <a:cs typeface="+mn-cs"/>
+              </a:rPr>
+              <a:t>maintaining and extending</a:t>
+            </a:r>
+            <a:r>
+              <a:rPr lang="en-GB" sz="1200" b="0" i="0" kern="1200" dirty="0" smtClean="0">
+                <a:solidFill>
+                  <a:schemeClr val="tx1"/>
+                </a:solidFill>
+                <a:effectLst/>
+                <a:latin typeface="+mn-lt"/>
+                <a:ea typeface="+mn-ea"/>
+                <a:cs typeface="+mn-cs"/>
+              </a:rPr>
+              <a:t> existing code</a:t>
+            </a:r>
           </a:p>
           <a:p>
             <a:r>
@@ -1058,7 +831,31 @@
                 <a:ea typeface="+mn-ea"/>
                 <a:cs typeface="+mn-cs"/>
               </a:rPr>
-              <a:t>loose </a:t>
+              <a:t>loose coupling</a:t>
+            </a:r>
+            <a:r>
+              <a:rPr lang="en-GB" sz="1200" b="0" i="1" kern="1200" dirty="0" smtClean="0">
+                <a:solidFill>
+                  <a:schemeClr val="tx1"/>
+                </a:solidFill>
+                <a:effectLst/>
+                <a:latin typeface="+mn-lt"/>
+                <a:ea typeface="+mn-ea"/>
+                <a:cs typeface="+mn-cs"/>
+              </a:rPr>
+              <a:t>.  </a:t>
+            </a:r>
+            <a:r>
+              <a:rPr lang="en-GB" sz="1200" b="0" i="0" kern="1200" dirty="0" smtClean="0">
+                <a:solidFill>
+                  <a:schemeClr val="tx1"/>
+                </a:solidFill>
+                <a:effectLst/>
+                <a:latin typeface="+mn-lt"/>
+                <a:ea typeface="+mn-ea"/>
+                <a:cs typeface="+mn-cs"/>
+              </a:rPr>
+              <a:t>DI enables </a:t>
             </a:r>
             <a:r>
               <a:rPr lang="en-GB" sz="1200" b="1" i="1" kern="1200" dirty="0" smtClean="0">
@@ -1070,8 +867,17 @@
                 <a:ea typeface="+mn-ea"/>
                 <a:cs typeface="+mn-cs"/>
               </a:rPr>
-              <a:t>coupling</a:t>
-            </a:r>
+              <a:t>loose coupling</a:t>
+            </a:r>
+            <a:endParaRPr lang="en-GB" sz="1200" b="1" i="0" kern="1200" dirty="0" smtClean="0">
+              <a:solidFill>
+                <a:schemeClr val="tx1"/>
+              </a:solidFill>
+              <a:effectLst/>
+              <a:latin typeface="+mn-lt"/>
+              <a:ea typeface="+mn-ea"/>
+              <a:cs typeface="+mn-cs"/>
+            </a:endParaRPr>
           </a:p>
           <a:p>
             <a:endParaRPr lang="en-GB" dirty="0"/>
@@ -1095,7 +901,7 @@
           <a:p>
             <a:fld id="{A8040AC0-89A1-4E06-96D3-E89AFC69B5AD}" type="slidenum">
               <a:rPr lang="en-GB" smtClean="0"/>
-              <a:t>3</a:t>
+              <a:t>2</a:t>
             </a:fld>
             <a:endParaRPr lang="en-GB"/>
           </a:p>
@@ -1104,7 +910,7 @@
     </p:spTree>
     <p:extLst>
       <p:ext uri="{BB962C8B-B14F-4D97-AF65-F5344CB8AC3E}">
-        <p14:creationId xmlns:p14="http://schemas.microsoft.com/office/powerpoint/2010/main" val="3681602958"/>
+        <p14:creationId xmlns:p14="http://schemas.microsoft.com/office/powerpoint/2010/main" val="2059128894"/>
       </p:ext>
     </p:extLst>
   </p:cSld>
@@ -1158,6 +964,184 @@
           <a:bodyPr/>
           <a:lstStyle/>
           <a:p>
+            <a:r>
+              <a:rPr lang="en-GB" dirty="0" smtClean="0"/>
+              <a:t>Example8</a:t>
+            </a:r>
+          </a:p>
+          <a:p>
+            <a:endParaRPr lang="en-GB" dirty="0" smtClean="0"/>
+          </a:p>
+          <a:p>
+            <a:r>
+              <a:rPr lang="en-GB" dirty="0" smtClean="0"/>
+              <a:t>This is a console app which reads a text file (</a:t>
+            </a:r>
+            <a:r>
+              <a:rPr lang="en-GB" dirty="0" err="1" smtClean="0"/>
+              <a:t>sql</a:t>
+            </a:r>
+            <a:r>
+              <a:rPr lang="en-GB" dirty="0" smtClean="0"/>
+              <a:t> in it), searches for an old </a:t>
+            </a:r>
+            <a:r>
+              <a:rPr lang="en-GB" dirty="0" err="1" smtClean="0"/>
+              <a:t>db</a:t>
+            </a:r>
+            <a:r>
+              <a:rPr lang="en-GB" dirty="0" smtClean="0"/>
+              <a:t> name</a:t>
+            </a:r>
+            <a:r>
+              <a:rPr lang="en-GB" baseline="0" dirty="0" smtClean="0"/>
+              <a:t>, replaces it with a new </a:t>
+            </a:r>
+            <a:r>
+              <a:rPr lang="en-GB" baseline="0" dirty="0" err="1" smtClean="0"/>
+              <a:t>dbName</a:t>
+            </a:r>
+            <a:endParaRPr lang="en-GB" baseline="0" dirty="0" smtClean="0"/>
+          </a:p>
+          <a:p>
+            <a:r>
+              <a:rPr lang="en-GB" baseline="0" dirty="0" smtClean="0"/>
+              <a:t>Then writes the output to the screen</a:t>
+            </a:r>
+          </a:p>
+          <a:p>
+            <a:endParaRPr lang="en-GB" baseline="0" dirty="0" smtClean="0"/>
+          </a:p>
+          <a:p>
+            <a:r>
+              <a:rPr lang="en-GB" baseline="0" dirty="0" smtClean="0"/>
+              <a:t>Show text file</a:t>
+            </a:r>
+          </a:p>
+          <a:p>
+            <a:endParaRPr lang="en-GB" baseline="0" dirty="0" smtClean="0"/>
+          </a:p>
+          <a:p>
+            <a:r>
+              <a:rPr lang="en-GB" sz="1200" b="0" i="0" kern="1200" dirty="0" smtClean="0">
+                <a:solidFill>
+                  <a:schemeClr val="tx1"/>
+                </a:solidFill>
+                <a:effectLst/>
+                <a:latin typeface="+mn-lt"/>
+                <a:ea typeface="+mn-ea"/>
+                <a:cs typeface="+mn-cs"/>
+              </a:rPr>
+              <a:t>This</a:t>
+            </a:r>
+            <a:r>
+              <a:rPr lang="en-GB" sz="1200" b="0" i="0" kern="1200" baseline="0" dirty="0" smtClean="0">
+                <a:solidFill>
+                  <a:schemeClr val="tx1"/>
+                </a:solidFill>
+                <a:effectLst/>
+                <a:latin typeface="+mn-lt"/>
+                <a:ea typeface="+mn-ea"/>
+                <a:cs typeface="+mn-cs"/>
+              </a:rPr>
+              <a:t> application is going to be long lived and needs be </a:t>
+            </a:r>
+            <a:r>
+              <a:rPr lang="en-GB" sz="1200" b="1" i="0" kern="1200" baseline="0" dirty="0" smtClean="0">
+                <a:solidFill>
+                  <a:schemeClr val="tx1"/>
+                </a:solidFill>
+                <a:effectLst/>
+                <a:latin typeface="+mn-lt"/>
+                <a:ea typeface="+mn-ea"/>
+                <a:cs typeface="+mn-cs"/>
+              </a:rPr>
+              <a:t>maintained</a:t>
+            </a:r>
+            <a:r>
+              <a:rPr lang="en-GB" sz="1200" b="0" i="0" kern="1200" baseline="0" dirty="0" smtClean="0">
+                <a:solidFill>
+                  <a:schemeClr val="tx1"/>
+                </a:solidFill>
+                <a:effectLst/>
+                <a:latin typeface="+mn-lt"/>
+                <a:ea typeface="+mn-ea"/>
+                <a:cs typeface="+mn-cs"/>
+              </a:rPr>
+              <a:t> over many years and many developers</a:t>
+            </a:r>
+            <a:endParaRPr lang="en-GB" sz="1200" b="0" i="0" kern="1200" dirty="0" smtClean="0">
+              <a:solidFill>
+                <a:schemeClr val="tx1"/>
+              </a:solidFill>
+              <a:effectLst/>
+              <a:latin typeface="+mn-lt"/>
+              <a:ea typeface="+mn-ea"/>
+              <a:cs typeface="+mn-cs"/>
+            </a:endParaRPr>
+          </a:p>
+          <a:p>
+            <a:endParaRPr lang="en-GB" sz="1200" b="0" i="0" kern="1200" dirty="0" smtClean="0">
+              <a:solidFill>
+                <a:schemeClr val="tx1"/>
+              </a:solidFill>
+              <a:effectLst/>
+              <a:latin typeface="+mn-lt"/>
+              <a:ea typeface="+mn-ea"/>
+              <a:cs typeface="+mn-cs"/>
+            </a:endParaRPr>
+          </a:p>
+          <a:p>
+            <a:r>
+              <a:rPr lang="en-GB" sz="1200" b="0" i="0" kern="1200" dirty="0" smtClean="0">
+                <a:solidFill>
+                  <a:schemeClr val="tx1"/>
+                </a:solidFill>
+                <a:effectLst/>
+                <a:latin typeface="+mn-lt"/>
+                <a:ea typeface="+mn-ea"/>
+                <a:cs typeface="+mn-cs"/>
+              </a:rPr>
+              <a:t>One of the ways to make </a:t>
+            </a:r>
+            <a:r>
+              <a:rPr lang="en-GB" sz="1200" b="1" i="1" kern="1200" dirty="0" smtClean="0">
+                <a:solidFill>
+                  <a:schemeClr val="tx1"/>
+                </a:solidFill>
+                <a:effectLst/>
+                <a:latin typeface="+mn-lt"/>
+                <a:ea typeface="+mn-ea"/>
+                <a:cs typeface="+mn-cs"/>
+              </a:rPr>
+              <a:t>maintainable code</a:t>
+            </a:r>
+            <a:r>
+              <a:rPr lang="en-GB" sz="1200" b="0" i="0" kern="1200" dirty="0" smtClean="0">
+                <a:solidFill>
+                  <a:schemeClr val="tx1"/>
+                </a:solidFill>
+                <a:effectLst/>
+                <a:latin typeface="+mn-lt"/>
+                <a:ea typeface="+mn-ea"/>
+                <a:cs typeface="+mn-cs"/>
+              </a:rPr>
+              <a:t> is through </a:t>
+            </a:r>
+            <a:r>
+              <a:rPr lang="en-GB" sz="1200" b="1" i="1" kern="1200" dirty="0" smtClean="0">
+                <a:solidFill>
+                  <a:schemeClr val="tx1"/>
+                </a:solidFill>
+                <a:effectLst/>
+                <a:latin typeface="+mn-lt"/>
+                <a:ea typeface="+mn-ea"/>
+                <a:cs typeface="+mn-cs"/>
+              </a:rPr>
+              <a:t>loose coupling</a:t>
+            </a:r>
+          </a:p>
+          <a:p>
             <a:endParaRPr lang="en-GB" dirty="0"/>
           </a:p>
         </p:txBody>
@@ -1179,7 +1163,7 @@
           <a:p>
             <a:fld id="{A8040AC0-89A1-4E06-96D3-E89AFC69B5AD}" type="slidenum">
               <a:rPr lang="en-GB" smtClean="0"/>
-              <a:t>4</a:t>
+              <a:t>3</a:t>
             </a:fld>
             <a:endParaRPr lang="en-GB"/>
           </a:p>
@@ -1188,7 +1172,7 @@
     </p:spTree>
     <p:extLst>
       <p:ext uri="{BB962C8B-B14F-4D97-AF65-F5344CB8AC3E}">
-        <p14:creationId xmlns:p14="http://schemas.microsoft.com/office/powerpoint/2010/main" val="973425456"/>
+        <p14:creationId xmlns:p14="http://schemas.microsoft.com/office/powerpoint/2010/main" val="3681602958"/>
       </p:ext>
     </p:extLst>
   </p:cSld>
@@ -1242,6 +1226,90 @@
           <a:bodyPr/>
           <a:lstStyle/>
           <a:p>
+            <a:endParaRPr lang="en-GB" dirty="0"/>
+          </a:p>
+        </p:txBody>
+      </p:sp>
+      <p:sp>
+        <p:nvSpPr>
+          <p:cNvPr id="4" name="Slide Number Placeholder 3"/>
+          <p:cNvSpPr>
+            <a:spLocks noGrp="1"/>
+          </p:cNvSpPr>
+          <p:nvPr>
+            <p:ph type="sldNum" sz="quarter" idx="10"/>
+          </p:nvPr>
+        </p:nvSpPr>
+        <p:spPr/>
+        <p:txBody>
+          <a:bodyPr/>
+          <a:lstStyle/>
+          <a:p>
+            <a:fld id="{A8040AC0-89A1-4E06-96D3-E89AFC69B5AD}" type="slidenum">
+              <a:rPr lang="en-GB" smtClean="0"/>
+              <a:t>4</a:t>
+            </a:fld>
+            <a:endParaRPr lang="en-GB"/>
+          </a:p>
+        </p:txBody>
+      </p:sp>
+    </p:spTree>
+    <p:extLst>
+      <p:ext uri="{BB962C8B-B14F-4D97-AF65-F5344CB8AC3E}">
+        <p14:creationId xmlns:p14="http://schemas.microsoft.com/office/powerpoint/2010/main" val="973425456"/>
+      </p:ext>
+    </p:extLst>
+  </p:cSld>
+  <p:clrMapOvr>
+    <a:masterClrMapping/>
+  </p:clrMapOvr>
+</p:notes>
+</file>
+
+<file path=ppt/notesSlides/notesSlide5.xml><?xml version="1.0" encoding="utf-8"?>
+<p:notes xmlns:a="http://schemas.openxmlformats.org/drawingml/2006/main" xmlns:r="http://schemas.openxmlformats.org/officeDocument/2006/relationships" xmlns:p="http://schemas.openxmlformats.org/presentationml/2006/main">
+  <p:cSld>
+    <p:spTree>
+      <p:nvGrpSpPr>
+        <p:cNvPr id="1" name=""/>
+        <p:cNvGrpSpPr/>
+        <p:nvPr/>
+      </p:nvGrpSpPr>
+      <p:grpSpPr>
+        <a:xfrm>
+          <a:off x="0" y="0"/>
+          <a:ext cx="0" cy="0"/>
+          <a:chOff x="0" y="0"/>
+          <a:chExt cx="0" cy="0"/>
+        </a:xfrm>
+      </p:grpSpPr>
+      <p:sp>
+        <p:nvSpPr>
+          <p:cNvPr id="2" name="Slide Image Placeholder 1"/>
+          <p:cNvSpPr>
+            <a:spLocks noGrp="1" noRot="1" noChangeAspect="1"/>
+          </p:cNvSpPr>
+          <p:nvPr>
+            <p:ph type="sldImg"/>
+          </p:nvPr>
+        </p:nvSpPr>
+        <p:spPr/>
+      </p:sp>
+      <p:sp>
+        <p:nvSpPr>
+          <p:cNvPr id="3" name="Notes Placeholder 2"/>
+          <p:cNvSpPr>
+            <a:spLocks noGrp="1"/>
+          </p:cNvSpPr>
+          <p:nvPr>
+            <p:ph type="body" idx="1"/>
+          </p:nvPr>
+        </p:nvSpPr>
+        <p:spPr/>
+        <p:txBody>
+          <a:bodyPr/>
+          <a:lstStyle/>
+          <a:p>
             <a:r>
               <a:rPr lang="en-GB" dirty="0" smtClean="0"/>
               <a:t>Step through</a:t>
@@ -1272,11 +1340,7 @@
           <a:p>
             <a:r>
               <a:rPr lang="en-GB" baseline="0" dirty="0" smtClean="0"/>
-              <a:t>Collapse code </a:t>
-            </a:r>
-            <a:r>
-              <a:rPr lang="en-GB" baseline="0" dirty="0" smtClean="0"/>
-              <a:t>down</a:t>
+              <a:t>Collapse code down</a:t>
             </a:r>
           </a:p>
           <a:p>
@@ -1342,7 +1406,7 @@
 </p:notes>
 </file>
 
-<file path=ppt/notesSlides/notesSlide5.xml><?xml version="1.0" encoding="utf-8"?>
+<file path=ppt/notesSlides/notesSlide6.xml><?xml version="1.0" encoding="utf-8"?>
 <p:notes xmlns:a="http://schemas.openxmlformats.org/drawingml/2006/main" xmlns:r="http://schemas.openxmlformats.org/officeDocument/2006/relationships" xmlns:p="http://schemas.openxmlformats.org/presentationml/2006/main">
   <p:cSld>
     <p:spTree>
@@ -5120,7 +5184,7 @@
         </p:spPr>
         <p:txBody>
           <a:bodyPr>
-            <a:normAutofit/>
+            <a:normAutofit fontScale="92500" lnSpcReduction="10000"/>
           </a:bodyPr>
           <a:lstStyle/>
           <a:p>
@@ -5129,11 +5193,7 @@
             </a:pPr>
             <a:r>
               <a:rPr lang="en-GB" dirty="0" smtClean="0"/>
-              <a:t>Poor Mans DI / Pure DI / Constructor Based </a:t>
-            </a:r>
-            <a:r>
-              <a:rPr lang="en-GB" dirty="0" smtClean="0"/>
-              <a:t>DI – a way of doing Dependency inversion</a:t>
+              <a:t>Poor Mans DI / Pure DI / Constructor Based DI – a way of doing Dependency inversion</a:t>
             </a:r>
           </a:p>
           <a:p>
@@ -5156,8 +5216,44 @@
             </a:r>
             <a:r>
               <a:rPr lang="en-GB" dirty="0" smtClean="0"/>
-              <a:t> Inversion of Control – the pattern or principle</a:t>
-            </a:r>
+              <a:t> Inversion of Control – the pattern or </a:t>
+            </a:r>
+            <a:r>
+              <a:rPr lang="en-GB" dirty="0" smtClean="0"/>
+              <a:t>principle</a:t>
+            </a:r>
+          </a:p>
+          <a:p>
+            <a:pPr marL="0" indent="0">
+              <a:buNone/>
+            </a:pPr>
+            <a:endParaRPr lang="en-GB" dirty="0"/>
+          </a:p>
+          <a:p>
+            <a:pPr marL="0" indent="0">
+              <a:buNone/>
+            </a:pPr>
+            <a:r>
+              <a:rPr lang="en-GB" dirty="0" err="1" smtClean="0"/>
+              <a:t>Github.con</a:t>
+            </a:r>
+            <a:r>
+              <a:rPr lang="en-GB" dirty="0" smtClean="0"/>
+              <a:t>/</a:t>
+            </a:r>
+            <a:r>
+              <a:rPr lang="en-GB" dirty="0" err="1" smtClean="0"/>
+              <a:t>djhmateer</a:t>
+            </a:r>
+            <a:r>
+              <a:rPr lang="en-GB" dirty="0" smtClean="0"/>
+              <a:t>/</a:t>
+            </a:r>
+            <a:r>
+              <a:rPr lang="en-GB" dirty="0" err="1" smtClean="0"/>
+              <a:t>altnetdi</a:t>
+            </a:r>
+            <a:endParaRPr lang="en-GB" dirty="0" smtClean="0"/>
           </a:p>
           <a:p>
             <a:pPr marL="0" indent="0">
@@ -5211,6 +5307,13 @@
   <p:clrMapOvr>
     <a:masterClrMapping/>
   </p:clrMapOvr>
+  <p:timing>
+    <p:tnLst>
+      <p:par>
+        <p:cTn id="1" dur="indefinite" restart="never" nodeType="tmRoot"/>
+      </p:par>
+    </p:tnLst>
+  </p:timing>
 </p:sld>
 </file>
 

</xml_diff>